<commit_message>
Update MainMovies to demonstrate Movie class usage
</commit_message>
<xml_diff>
--- a/week2/activity/Week2Activity.pptx
+++ b/week2/activity/Week2Activity.pptx
@@ -272,7 +272,7 @@
           <a:p>
             <a:fld id="{4B29CC5D-2991-3F41-B792-683ACA78B7B7}" type="datetimeFigureOut">
               <a:rPr lang="en-US" smtClean="0"/>
-              <a:t>10/1/23</a:t>
+              <a:t>9/22/2025</a:t>
             </a:fld>
             <a:endParaRPr lang="en-US"/>
           </a:p>
@@ -472,7 +472,7 @@
           <a:p>
             <a:fld id="{4B29CC5D-2991-3F41-B792-683ACA78B7B7}" type="datetimeFigureOut">
               <a:rPr lang="en-US" smtClean="0"/>
-              <a:t>10/1/23</a:t>
+              <a:t>9/22/2025</a:t>
             </a:fld>
             <a:endParaRPr lang="en-US"/>
           </a:p>
@@ -682,7 +682,7 @@
           <a:p>
             <a:fld id="{4B29CC5D-2991-3F41-B792-683ACA78B7B7}" type="datetimeFigureOut">
               <a:rPr lang="en-US" smtClean="0"/>
-              <a:t>10/1/23</a:t>
+              <a:t>9/22/2025</a:t>
             </a:fld>
             <a:endParaRPr lang="en-US"/>
           </a:p>
@@ -882,7 +882,7 @@
           <a:p>
             <a:fld id="{4B29CC5D-2991-3F41-B792-683ACA78B7B7}" type="datetimeFigureOut">
               <a:rPr lang="en-US" smtClean="0"/>
-              <a:t>10/1/23</a:t>
+              <a:t>9/22/2025</a:t>
             </a:fld>
             <a:endParaRPr lang="en-US"/>
           </a:p>
@@ -1158,7 +1158,7 @@
           <a:p>
             <a:fld id="{4B29CC5D-2991-3F41-B792-683ACA78B7B7}" type="datetimeFigureOut">
               <a:rPr lang="en-US" smtClean="0"/>
-              <a:t>10/1/23</a:t>
+              <a:t>9/22/2025</a:t>
             </a:fld>
             <a:endParaRPr lang="en-US"/>
           </a:p>
@@ -1426,7 +1426,7 @@
           <a:p>
             <a:fld id="{4B29CC5D-2991-3F41-B792-683ACA78B7B7}" type="datetimeFigureOut">
               <a:rPr lang="en-US" smtClean="0"/>
-              <a:t>10/1/23</a:t>
+              <a:t>9/22/2025</a:t>
             </a:fld>
             <a:endParaRPr lang="en-US"/>
           </a:p>
@@ -1841,7 +1841,7 @@
           <a:p>
             <a:fld id="{4B29CC5D-2991-3F41-B792-683ACA78B7B7}" type="datetimeFigureOut">
               <a:rPr lang="en-US" smtClean="0"/>
-              <a:t>10/1/23</a:t>
+              <a:t>9/22/2025</a:t>
             </a:fld>
             <a:endParaRPr lang="en-US"/>
           </a:p>
@@ -1983,7 +1983,7 @@
           <a:p>
             <a:fld id="{4B29CC5D-2991-3F41-B792-683ACA78B7B7}" type="datetimeFigureOut">
               <a:rPr lang="en-US" smtClean="0"/>
-              <a:t>10/1/23</a:t>
+              <a:t>9/22/2025</a:t>
             </a:fld>
             <a:endParaRPr lang="en-US"/>
           </a:p>
@@ -2096,7 +2096,7 @@
           <a:p>
             <a:fld id="{4B29CC5D-2991-3F41-B792-683ACA78B7B7}" type="datetimeFigureOut">
               <a:rPr lang="en-US" smtClean="0"/>
-              <a:t>10/1/23</a:t>
+              <a:t>9/22/2025</a:t>
             </a:fld>
             <a:endParaRPr lang="en-US"/>
           </a:p>
@@ -2409,7 +2409,7 @@
           <a:p>
             <a:fld id="{4B29CC5D-2991-3F41-B792-683ACA78B7B7}" type="datetimeFigureOut">
               <a:rPr lang="en-US" smtClean="0"/>
-              <a:t>10/1/23</a:t>
+              <a:t>9/22/2025</a:t>
             </a:fld>
             <a:endParaRPr lang="en-US"/>
           </a:p>
@@ -2698,7 +2698,7 @@
           <a:p>
             <a:fld id="{4B29CC5D-2991-3F41-B792-683ACA78B7B7}" type="datetimeFigureOut">
               <a:rPr lang="en-US" smtClean="0"/>
-              <a:t>10/1/23</a:t>
+              <a:t>9/22/2025</a:t>
             </a:fld>
             <a:endParaRPr lang="en-US"/>
           </a:p>
@@ -2941,7 +2941,7 @@
           <a:p>
             <a:fld id="{4B29CC5D-2991-3F41-B792-683ACA78B7B7}" type="datetimeFigureOut">
               <a:rPr lang="en-US" smtClean="0"/>
-              <a:t>10/1/23</a:t>
+              <a:t>9/22/2025</a:t>
             </a:fld>
             <a:endParaRPr lang="en-US"/>
           </a:p>
@@ -4091,7 +4091,9 @@
         </p:nvSpPr>
         <p:spPr/>
         <p:txBody>
-          <a:bodyPr/>
+          <a:bodyPr>
+            <a:normAutofit fontScale="92500" lnSpcReduction="10000"/>
+          </a:bodyPr>
           <a:lstStyle/>
           <a:p>
             <a:r>
@@ -4109,6 +4111,17 @@
             </a:r>
           </a:p>
           <a:p>
+            <a:pPr lvl="1"/>
+            <a:r>
+              <a:rPr lang="en-US" dirty="0">
+                <a:solidFill>
+                  <a:srgbClr val="FF0000"/>
+                </a:solidFill>
+              </a:rPr>
+              <a:t>The code to instantiate the object should be placed in Main.java.</a:t>
+            </a:r>
+          </a:p>
+          <a:p>
             <a:r>
               <a:rPr lang="en-US" dirty="0"/>
               <a:t>What is the </a:t>
@@ -4123,6 +4136,17 @@
             </a:r>
           </a:p>
           <a:p>
+            <a:pPr lvl="1"/>
+            <a:r>
+              <a:rPr lang="en-US" dirty="0">
+                <a:solidFill>
+                  <a:srgbClr val="FF0000"/>
+                </a:solidFill>
+              </a:rPr>
+              <a:t>Movie</a:t>
+            </a:r>
+          </a:p>
+          <a:p>
             <a:r>
               <a:rPr lang="en-US" dirty="0"/>
               <a:t>Suggest a </a:t>
@@ -4137,6 +4161,17 @@
             </a:r>
           </a:p>
           <a:p>
+            <a:pPr lvl="1"/>
+            <a:r>
+              <a:rPr lang="en-US" dirty="0">
+                <a:solidFill>
+                  <a:srgbClr val="FF0000"/>
+                </a:solidFill>
+              </a:rPr>
+              <a:t>E.g., movie1</a:t>
+            </a:r>
+          </a:p>
+          <a:p>
             <a:r>
               <a:rPr lang="en-US" dirty="0"/>
               <a:t>What important word will appear in the </a:t>
@@ -4148,6 +4183,17 @@
             <a:r>
               <a:rPr lang="en-US" dirty="0"/>
               <a:t> to show a new object has been created?</a:t>
+            </a:r>
+          </a:p>
+          <a:p>
+            <a:pPr lvl="1"/>
+            <a:r>
+              <a:rPr lang="en-US" dirty="0">
+                <a:solidFill>
+                  <a:srgbClr val="FF0000"/>
+                </a:solidFill>
+              </a:rPr>
+              <a:t>new (https://www.geeksforgeeks.org/java/new-operator-java/)</a:t>
             </a:r>
           </a:p>
         </p:txBody>
@@ -4250,7 +4296,18 @@
             </a:r>
             <a:r>
               <a:rPr lang="en-US" dirty="0"/>
-              <a:t> is required to create a movie object?   </a:t>
+              <a:t> is required to create a movie object?</a:t>
+            </a:r>
+          </a:p>
+          <a:p>
+            <a:pPr lvl="1"/>
+            <a:r>
+              <a:rPr lang="en-US" dirty="0">
+                <a:solidFill>
+                  <a:srgbClr val="FF0000"/>
+                </a:solidFill>
+              </a:rPr>
+              <a:t>E.g.: Movie movie1 = new Movie();   </a:t>
             </a:r>
           </a:p>
           <a:p>
@@ -4274,6 +4331,40 @@
               <a:rPr lang="en-US" dirty="0"/>
               <a:t> of the new movie object will be?</a:t>
             </a:r>
+          </a:p>
+          <a:p>
+            <a:pPr lvl="1"/>
+            <a:r>
+              <a:rPr lang="en-US" dirty="0">
+                <a:solidFill>
+                  <a:srgbClr val="FF0000"/>
+                </a:solidFill>
+              </a:rPr>
+              <a:t>Yes, e.g.: Movie movie2 = new Movie("The Godfather", 175);</a:t>
+            </a:r>
+          </a:p>
+          <a:p>
+            <a:pPr marL="457200" lvl="1" indent="0">
+              <a:buNone/>
+            </a:pPr>
+            <a:r>
+              <a:rPr lang="en-US" dirty="0">
+                <a:solidFill>
+                  <a:srgbClr val="FF0000"/>
+                </a:solidFill>
+              </a:rPr>
+              <a:t>This is because there is a Movie constructor which job is to take the information as we feed in, and assign it to the designated properties.</a:t>
+            </a:r>
+          </a:p>
+          <a:p>
+            <a:pPr marL="457200" lvl="1" indent="0">
+              <a:buNone/>
+            </a:pPr>
+            <a:endParaRPr lang="en-US" dirty="0">
+              <a:solidFill>
+                <a:srgbClr val="FF0000"/>
+              </a:solidFill>
+            </a:endParaRPr>
           </a:p>
         </p:txBody>
       </p:sp>
@@ -4382,6 +4473,30 @@
             </a:r>
           </a:p>
           <a:p>
+            <a:pPr lvl="1"/>
+            <a:r>
+              <a:rPr lang="en-GB" dirty="0" err="1">
+                <a:solidFill>
+                  <a:srgbClr val="FF0000"/>
+                </a:solidFill>
+              </a:rPr>
+              <a:t>getRunningTime</a:t>
+            </a:r>
+            <a:r>
+              <a:rPr lang="en-GB" dirty="0">
+                <a:solidFill>
+                  <a:srgbClr val="FF0000"/>
+                </a:solidFill>
+              </a:rPr>
+              <a:t>()</a:t>
+            </a:r>
+            <a:endParaRPr lang="en-US" dirty="0">
+              <a:solidFill>
+                <a:srgbClr val="FF0000"/>
+              </a:solidFill>
+            </a:endParaRPr>
+          </a:p>
+          <a:p>
             <a:r>
               <a:rPr lang="en-US" dirty="0"/>
               <a:t>What </a:t>
@@ -4393,6 +4508,65 @@
             <a:r>
               <a:rPr lang="en-US" dirty="0"/>
               <a:t> is required to call this method and print the result?</a:t>
+            </a:r>
+          </a:p>
+          <a:p>
+            <a:pPr lvl="1"/>
+            <a:r>
+              <a:rPr lang="en-US" dirty="0">
+                <a:solidFill>
+                  <a:srgbClr val="FF0000"/>
+                </a:solidFill>
+              </a:rPr>
+              <a:t>E.g.: </a:t>
+            </a:r>
+            <a:r>
+              <a:rPr lang="en-US" dirty="0" err="1">
+                <a:solidFill>
+                  <a:srgbClr val="FF0000"/>
+                </a:solidFill>
+              </a:rPr>
+              <a:t>System.out.println</a:t>
+            </a:r>
+            <a:r>
+              <a:rPr lang="en-US" dirty="0">
+                <a:solidFill>
+                  <a:srgbClr val="FF0000"/>
+                </a:solidFill>
+              </a:rPr>
+              <a:t>(movie1.</a:t>
+            </a:r>
+            <a:r>
+              <a:rPr lang="en-GB" dirty="0">
+                <a:solidFill>
+                  <a:srgbClr val="FF0000"/>
+                </a:solidFill>
+              </a:rPr>
+              <a:t> </a:t>
+            </a:r>
+            <a:r>
+              <a:rPr lang="en-GB" dirty="0" err="1">
+                <a:solidFill>
+                  <a:srgbClr val="FF0000"/>
+                </a:solidFill>
+              </a:rPr>
+              <a:t>getRunningTime</a:t>
+            </a:r>
+            <a:r>
+              <a:rPr lang="en-GB" dirty="0">
+                <a:solidFill>
+                  <a:srgbClr val="FF0000"/>
+                </a:solidFill>
+              </a:rPr>
+              <a:t>()</a:t>
+            </a:r>
+            <a:r>
+              <a:rPr lang="en-US" dirty="0">
+                <a:solidFill>
+                  <a:srgbClr val="FF0000"/>
+                </a:solidFill>
+              </a:rPr>
+              <a:t>)</a:t>
             </a:r>
           </a:p>
         </p:txBody>
@@ -4491,6 +4665,18 @@
             </a:r>
           </a:p>
           <a:p>
+            <a:pPr lvl="1"/>
+            <a:r>
+              <a:rPr lang="en-GB" dirty="0">
+                <a:solidFill>
+                  <a:srgbClr val="FF0000"/>
+                </a:solidFill>
+              </a:rPr>
+              <a:t>play()</a:t>
+            </a:r>
+            <a:endParaRPr lang="en-US" dirty="0"/>
+          </a:p>
+          <a:p>
             <a:r>
               <a:rPr lang="en-US" dirty="0"/>
               <a:t>What </a:t>
@@ -4503,6 +4689,38 @@
               <a:rPr lang="en-US" dirty="0"/>
               <a:t> is required to call this method?</a:t>
             </a:r>
+          </a:p>
+          <a:p>
+            <a:pPr lvl="1"/>
+            <a:r>
+              <a:rPr lang="en-US" dirty="0">
+                <a:solidFill>
+                  <a:srgbClr val="FF0000"/>
+                </a:solidFill>
+              </a:rPr>
+              <a:t>E.g.: </a:t>
+            </a:r>
+            <a:r>
+              <a:rPr lang="en-GB" dirty="0">
+                <a:solidFill>
+                  <a:srgbClr val="FF0000"/>
+                </a:solidFill>
+              </a:rPr>
+              <a:t>movie2.play()</a:t>
+            </a:r>
+            <a:r>
+              <a:rPr lang="en-GB" b="1" dirty="0">
+                <a:solidFill>
+                  <a:srgbClr val="FF0000"/>
+                </a:solidFill>
+              </a:rPr>
+              <a:t>;</a:t>
+            </a:r>
+            <a:endParaRPr lang="en-US" dirty="0">
+              <a:solidFill>
+                <a:srgbClr val="FF0000"/>
+              </a:solidFill>
+            </a:endParaRPr>
           </a:p>
           <a:p>
             <a:endParaRPr lang="en-US" dirty="0"/>
@@ -4585,7 +4803,9 @@
         </p:nvSpPr>
         <p:spPr/>
         <p:txBody>
-          <a:bodyPr/>
+          <a:bodyPr>
+            <a:normAutofit lnSpcReduction="10000"/>
+          </a:bodyPr>
           <a:lstStyle/>
           <a:p>
             <a:r>
@@ -4603,6 +4823,22 @@
             </a:r>
           </a:p>
           <a:p>
+            <a:pPr lvl="1"/>
+            <a:r>
+              <a:rPr lang="en-GB" dirty="0">
+                <a:solidFill>
+                  <a:srgbClr val="FF0000"/>
+                </a:solidFill>
+              </a:rPr>
+              <a:t>stop()</a:t>
+            </a:r>
+            <a:endParaRPr lang="en-US" dirty="0">
+              <a:solidFill>
+                <a:srgbClr val="FF0000"/>
+              </a:solidFill>
+            </a:endParaRPr>
+          </a:p>
+          <a:p>
             <a:r>
               <a:rPr lang="en-US" dirty="0"/>
               <a:t>What </a:t>
@@ -4617,6 +4853,30 @@
             </a:r>
           </a:p>
           <a:p>
+            <a:pPr lvl="1"/>
+            <a:r>
+              <a:rPr lang="en-GB" dirty="0">
+                <a:solidFill>
+                  <a:srgbClr val="FF0000"/>
+                </a:solidFill>
+              </a:rPr>
+              <a:t>E.g.: movie2.stop()</a:t>
+            </a:r>
+            <a:r>
+              <a:rPr lang="en-GB" b="1" dirty="0">
+                <a:solidFill>
+                  <a:srgbClr val="FF0000"/>
+                </a:solidFill>
+              </a:rPr>
+              <a:t>;</a:t>
+            </a:r>
+            <a:endParaRPr lang="en-US" dirty="0">
+              <a:solidFill>
+                <a:srgbClr val="FF0000"/>
+              </a:solidFill>
+            </a:endParaRPr>
+          </a:p>
+          <a:p>
             <a:r>
               <a:rPr lang="en-US" dirty="0"/>
               <a:t>What </a:t>
@@ -4629,6 +4889,38 @@
               <a:rPr lang="en-US" dirty="0"/>
               <a:t> would be needed to find the time reached in playing the movie?</a:t>
             </a:r>
+          </a:p>
+          <a:p>
+            <a:pPr lvl="1"/>
+            <a:r>
+              <a:rPr lang="en-US" dirty="0">
+                <a:solidFill>
+                  <a:srgbClr val="FF0000"/>
+                </a:solidFill>
+              </a:rPr>
+              <a:t>E.g.: </a:t>
+            </a:r>
+            <a:r>
+              <a:rPr lang="en-GB" dirty="0">
+                <a:solidFill>
+                  <a:srgbClr val="FF0000"/>
+                </a:solidFill>
+              </a:rPr>
+              <a:t>movie2.getTimeReached()</a:t>
+            </a:r>
+            <a:r>
+              <a:rPr lang="en-GB" b="1" dirty="0">
+                <a:solidFill>
+                  <a:srgbClr val="FF0000"/>
+                </a:solidFill>
+              </a:rPr>
+              <a:t>;</a:t>
+            </a:r>
+            <a:endParaRPr lang="en-GB" dirty="0">
+              <a:solidFill>
+                <a:srgbClr val="FF0000"/>
+              </a:solidFill>
+            </a:endParaRPr>
           </a:p>
         </p:txBody>
       </p:sp>
@@ -4732,6 +5024,10 @@
               <a:rPr lang="en-US" dirty="0"/>
               <a:t>What can you deduce about what these methods actually do?</a:t>
             </a:r>
+          </a:p>
+          <a:p>
+            <a:pPr lvl="1"/>
+            <a:endParaRPr lang="en-US" dirty="0"/>
           </a:p>
         </p:txBody>
       </p:sp>

</xml_diff>

<commit_message>
Update MainMovies to demonstrate PlayList integration
</commit_message>
<xml_diff>
--- a/week2/activity/Week2Activity.pptx
+++ b/week2/activity/Week2Activity.pptx
@@ -3520,7 +3520,74 @@
             </a:r>
             <a:r>
               <a:rPr lang="en-US" dirty="0"/>
-              <a:t> is required to create the object?   </a:t>
+              <a:t> is required to create the object?</a:t>
+            </a:r>
+          </a:p>
+          <a:p>
+            <a:pPr lvl="1"/>
+            <a:r>
+              <a:rPr lang="en-GB" dirty="0" err="1">
+                <a:solidFill>
+                  <a:srgbClr val="FF0000"/>
+                </a:solidFill>
+              </a:rPr>
+              <a:t>PlayList</a:t>
+            </a:r>
+            <a:r>
+              <a:rPr lang="en-GB" dirty="0">
+                <a:solidFill>
+                  <a:srgbClr val="FF0000"/>
+                </a:solidFill>
+              </a:rPr>
+              <a:t> </a:t>
+            </a:r>
+            <a:r>
+              <a:rPr lang="en-GB" dirty="0" err="1">
+                <a:solidFill>
+                  <a:srgbClr val="FF0000"/>
+                </a:solidFill>
+              </a:rPr>
+              <a:t>playList</a:t>
+            </a:r>
+            <a:r>
+              <a:rPr lang="en-GB" dirty="0">
+                <a:solidFill>
+                  <a:srgbClr val="FF0000"/>
+                </a:solidFill>
+              </a:rPr>
+              <a:t> = new </a:t>
+            </a:r>
+            <a:r>
+              <a:rPr lang="en-GB" dirty="0" err="1">
+                <a:solidFill>
+                  <a:srgbClr val="FF0000"/>
+                </a:solidFill>
+              </a:rPr>
+              <a:t>PlayList</a:t>
+            </a:r>
+            <a:r>
+              <a:rPr lang="en-GB" dirty="0">
+                <a:solidFill>
+                  <a:srgbClr val="FF0000"/>
+                </a:solidFill>
+              </a:rPr>
+              <a:t>()</a:t>
+            </a:r>
+            <a:r>
+              <a:rPr lang="en-GB" b="1" dirty="0">
+                <a:solidFill>
+                  <a:srgbClr val="FF0000"/>
+                </a:solidFill>
+              </a:rPr>
+              <a:t>;</a:t>
+            </a:r>
+            <a:r>
+              <a:rPr lang="en-US" dirty="0">
+                <a:solidFill>
+                  <a:srgbClr val="FF0000"/>
+                </a:solidFill>
+              </a:rPr>
+              <a:t>  </a:t>
             </a:r>
           </a:p>
         </p:txBody>
@@ -3624,15 +3691,90 @@
             </a:r>
           </a:p>
           <a:p>
+            <a:pPr lvl="1"/>
+            <a:r>
+              <a:rPr lang="en-GB" dirty="0" err="1">
+                <a:solidFill>
+                  <a:srgbClr val="FF0000"/>
+                </a:solidFill>
+              </a:rPr>
+              <a:t>addToPlayList</a:t>
+            </a:r>
+            <a:r>
+              <a:rPr lang="en-GB" dirty="0">
+                <a:solidFill>
+                  <a:srgbClr val="FF0000"/>
+                </a:solidFill>
+              </a:rPr>
+              <a:t>()</a:t>
+            </a:r>
+            <a:endParaRPr lang="en-US" dirty="0">
+              <a:solidFill>
+                <a:srgbClr val="FF0000"/>
+              </a:solidFill>
+            </a:endParaRPr>
+          </a:p>
+          <a:p>
             <a:r>
               <a:rPr lang="en-US" dirty="0"/>
               <a:t>What class does this method belong to?</a:t>
             </a:r>
           </a:p>
           <a:p>
+            <a:pPr lvl="1"/>
+            <a:r>
+              <a:rPr lang="en-US" dirty="0">
+                <a:solidFill>
+                  <a:srgbClr val="FF0000"/>
+                </a:solidFill>
+              </a:rPr>
+              <a:t>It belongs to the class </a:t>
+            </a:r>
+            <a:r>
+              <a:rPr lang="en-US" dirty="0" err="1">
+                <a:solidFill>
+                  <a:srgbClr val="FF0000"/>
+                </a:solidFill>
+              </a:rPr>
+              <a:t>PlayList</a:t>
+            </a:r>
+            <a:endParaRPr lang="en-US" dirty="0">
+              <a:solidFill>
+                <a:srgbClr val="FF0000"/>
+              </a:solidFill>
+            </a:endParaRPr>
+          </a:p>
+          <a:p>
             <a:r>
               <a:rPr lang="en-US" dirty="0"/>
               <a:t>What should the parameter for this method be?</a:t>
+            </a:r>
+          </a:p>
+          <a:p>
+            <a:pPr lvl="1"/>
+            <a:r>
+              <a:rPr lang="en-US" dirty="0">
+                <a:solidFill>
+                  <a:srgbClr val="FF0000"/>
+                </a:solidFill>
+              </a:rPr>
+              <a:t>The parameter should be a Movie object: </a:t>
+            </a:r>
+            <a:r>
+              <a:rPr lang="en-GB" dirty="0" err="1">
+                <a:solidFill>
+                  <a:srgbClr val="FF0000"/>
+                </a:solidFill>
+              </a:rPr>
+              <a:t>playList.addToPlayList</a:t>
+            </a:r>
+            <a:r>
+              <a:rPr lang="en-GB" dirty="0">
+                <a:solidFill>
+                  <a:srgbClr val="FF0000"/>
+                </a:solidFill>
+              </a:rPr>
+              <a:t>(movie1);</a:t>
             </a:r>
           </a:p>
         </p:txBody>
@@ -3754,6 +3896,73 @@
               <a:t> and to show the list?</a:t>
             </a:r>
           </a:p>
+          <a:p>
+            <a:pPr lvl="1"/>
+            <a:r>
+              <a:rPr lang="en-GB" dirty="0" err="1">
+                <a:solidFill>
+                  <a:srgbClr val="FF0000"/>
+                </a:solidFill>
+              </a:rPr>
+              <a:t>playList.addToPlayList</a:t>
+            </a:r>
+            <a:r>
+              <a:rPr lang="en-GB" dirty="0">
+                <a:solidFill>
+                  <a:srgbClr val="FF0000"/>
+                </a:solidFill>
+              </a:rPr>
+              <a:t>(movie2)</a:t>
+            </a:r>
+            <a:r>
+              <a:rPr lang="en-GB" b="1" dirty="0">
+                <a:solidFill>
+                  <a:srgbClr val="FF0000"/>
+                </a:solidFill>
+              </a:rPr>
+              <a:t>;</a:t>
+            </a:r>
+            <a:br>
+              <a:rPr lang="en-GB" b="1" dirty="0">
+                <a:solidFill>
+                  <a:srgbClr val="FF0000"/>
+                </a:solidFill>
+              </a:rPr>
+            </a:br>
+            <a:r>
+              <a:rPr lang="en-GB" dirty="0" err="1">
+                <a:solidFill>
+                  <a:srgbClr val="FF0000"/>
+                </a:solidFill>
+              </a:rPr>
+              <a:t>playList.showList</a:t>
+            </a:r>
+            <a:r>
+              <a:rPr lang="en-GB" dirty="0">
+                <a:solidFill>
+                  <a:srgbClr val="FF0000"/>
+                </a:solidFill>
+              </a:rPr>
+              <a:t>()</a:t>
+            </a:r>
+            <a:r>
+              <a:rPr lang="en-GB" b="1" dirty="0">
+                <a:solidFill>
+                  <a:srgbClr val="FF0000"/>
+                </a:solidFill>
+              </a:rPr>
+              <a:t>;</a:t>
+            </a:r>
+            <a:endParaRPr lang="en-GB" dirty="0">
+              <a:solidFill>
+                <a:srgbClr val="FF0000"/>
+              </a:solidFill>
+            </a:endParaRPr>
+          </a:p>
+          <a:p>
+            <a:pPr lvl="1"/>
+            <a:endParaRPr lang="en-US" dirty="0"/>
+          </a:p>
         </p:txBody>
       </p:sp>
     </p:spTree>
@@ -5000,7 +5209,9 @@
         </p:nvSpPr>
         <p:spPr/>
         <p:txBody>
-          <a:bodyPr/>
+          <a:bodyPr>
+            <a:normAutofit lnSpcReduction="10000"/>
+          </a:bodyPr>
           <a:lstStyle/>
           <a:p>
             <a:r>
@@ -5027,7 +5238,41 @@
           </a:p>
           <a:p>
             <a:pPr lvl="1"/>
-            <a:endParaRPr lang="en-US" dirty="0"/>
+            <a:r>
+              <a:rPr lang="en-US" i="1" dirty="0">
+                <a:solidFill>
+                  <a:srgbClr val="FF0000"/>
+                </a:solidFill>
+              </a:rPr>
+              <a:t>play() – sets time reached property to 10 (initially it was set to 0 as default), and playing to true (set to false as default). It also prints “Playing…” to the console.</a:t>
+            </a:r>
+          </a:p>
+          <a:p>
+            <a:pPr lvl="1"/>
+            <a:r>
+              <a:rPr lang="en-US" i="1" dirty="0">
+                <a:solidFill>
+                  <a:srgbClr val="FF0000"/>
+                </a:solidFill>
+              </a:rPr>
+              <a:t>stop() – sets playing to false and prints “Stopped…” to console.</a:t>
+            </a:r>
+          </a:p>
+          <a:p>
+            <a:pPr lvl="1"/>
+            <a:r>
+              <a:rPr lang="en-US" i="1" dirty="0">
+                <a:solidFill>
+                  <a:srgbClr val="FF0000"/>
+                </a:solidFill>
+              </a:rPr>
+              <a:t>resume() – sets playing to true, increments time reached attribute by 10, and prints “Playing…” to console. </a:t>
+            </a:r>
+            <a:endParaRPr lang="en-US" dirty="0">
+              <a:solidFill>
+                <a:srgbClr val="FF0000"/>
+              </a:solidFill>
+            </a:endParaRPr>
           </a:p>
         </p:txBody>
       </p:sp>

</xml_diff>